<commit_message>
Se agrego el cambio de las imagenes de la aplicacion final.
Estas diapositivas son las finales para la presentacion
</commit_message>
<xml_diff>
--- a/DiapositivasPST_Hometic.pptx
+++ b/DiapositivasPST_Hometic.pptx
@@ -5,7 +5,7 @@
     <p:sldMasterId id="2147483648" r:id="rId1"/>
   </p:sldMasterIdLst>
   <p:notesMasterIdLst>
-    <p:notesMasterId r:id="rId22"/>
+    <p:notesMasterId r:id="rId23"/>
   </p:notesMasterIdLst>
   <p:sldIdLst>
     <p:sldId id="256" r:id="rId2"/>
@@ -26,8 +26,9 @@
     <p:sldId id="306" r:id="rId17"/>
     <p:sldId id="316" r:id="rId18"/>
     <p:sldId id="317" r:id="rId19"/>
-    <p:sldId id="322" r:id="rId20"/>
-    <p:sldId id="327" r:id="rId21"/>
+    <p:sldId id="328" r:id="rId20"/>
+    <p:sldId id="322" r:id="rId21"/>
+    <p:sldId id="327" r:id="rId22"/>
   </p:sldIdLst>
   <p:sldSz cx="9144000" cy="6858000" type="screen4x3"/>
   <p:notesSz cx="6858000" cy="9144000"/>
@@ -227,7 +228,7 @@
           <a:p>
             <a:fld id="{6CFF0AA3-FD89-4527-808B-A20C9E178D5F}" type="datetimeFigureOut">
               <a:rPr lang="es-EC" smtClean="0"/>
-              <a:t>20/8/2019</a:t>
+              <a:t>21/8/2019</a:t>
             </a:fld>
             <a:endParaRPr lang="es-EC"/>
           </a:p>
@@ -386,7 +387,7 @@
           <a:p>
             <a:fld id="{02D4F7CD-E773-4B40-B11B-1A69189E669A}" type="slidenum">
               <a:rPr lang="es-EC" smtClean="0"/>
-              <a:t>‹Nº›</a:t>
+              <a:t>‹#›</a:t>
             </a:fld>
             <a:endParaRPr lang="es-EC"/>
           </a:p>
@@ -840,7 +841,7 @@
             <a:fld id="{25558161-4083-4137-B5EE-6591ED484BF1}" type="datetimeFigureOut">
               <a:rPr lang="es-ES" smtClean="0"/>
               <a:pPr/>
-              <a:t>20/08/2019</a:t>
+              <a:t>21/08/2019</a:t>
             </a:fld>
             <a:endParaRPr lang="es-ES"/>
           </a:p>
@@ -883,7 +884,7 @@
             <a:fld id="{01D25DD0-4F6C-4391-AB34-5533F4805C36}" type="slidenum">
               <a:rPr lang="es-ES" smtClean="0"/>
               <a:pPr/>
-              <a:t>‹Nº›</a:t>
+              <a:t>‹#›</a:t>
             </a:fld>
             <a:endParaRPr lang="es-ES"/>
           </a:p>
@@ -1010,7 +1011,7 @@
             <a:fld id="{25558161-4083-4137-B5EE-6591ED484BF1}" type="datetimeFigureOut">
               <a:rPr lang="es-ES" smtClean="0"/>
               <a:pPr/>
-              <a:t>20/08/2019</a:t>
+              <a:t>21/08/2019</a:t>
             </a:fld>
             <a:endParaRPr lang="es-ES"/>
           </a:p>
@@ -1053,7 +1054,7 @@
             <a:fld id="{01D25DD0-4F6C-4391-AB34-5533F4805C36}" type="slidenum">
               <a:rPr lang="es-ES" smtClean="0"/>
               <a:pPr/>
-              <a:t>‹Nº›</a:t>
+              <a:t>‹#›</a:t>
             </a:fld>
             <a:endParaRPr lang="es-ES"/>
           </a:p>
@@ -1190,7 +1191,7 @@
             <a:fld id="{25558161-4083-4137-B5EE-6591ED484BF1}" type="datetimeFigureOut">
               <a:rPr lang="es-ES" smtClean="0"/>
               <a:pPr/>
-              <a:t>20/08/2019</a:t>
+              <a:t>21/08/2019</a:t>
             </a:fld>
             <a:endParaRPr lang="es-ES"/>
           </a:p>
@@ -1233,7 +1234,7 @@
             <a:fld id="{01D25DD0-4F6C-4391-AB34-5533F4805C36}" type="slidenum">
               <a:rPr lang="es-ES" smtClean="0"/>
               <a:pPr/>
-              <a:t>‹Nº›</a:t>
+              <a:t>‹#›</a:t>
             </a:fld>
             <a:endParaRPr lang="es-ES"/>
           </a:p>
@@ -1360,7 +1361,7 @@
             <a:fld id="{25558161-4083-4137-B5EE-6591ED484BF1}" type="datetimeFigureOut">
               <a:rPr lang="es-ES" smtClean="0"/>
               <a:pPr/>
-              <a:t>20/08/2019</a:t>
+              <a:t>21/08/2019</a:t>
             </a:fld>
             <a:endParaRPr lang="es-ES"/>
           </a:p>
@@ -1403,7 +1404,7 @@
             <a:fld id="{01D25DD0-4F6C-4391-AB34-5533F4805C36}" type="slidenum">
               <a:rPr lang="es-ES" smtClean="0"/>
               <a:pPr/>
-              <a:t>‹Nº›</a:t>
+              <a:t>‹#›</a:t>
             </a:fld>
             <a:endParaRPr lang="es-ES"/>
           </a:p>
@@ -1607,7 +1608,7 @@
             <a:fld id="{25558161-4083-4137-B5EE-6591ED484BF1}" type="datetimeFigureOut">
               <a:rPr lang="es-ES" smtClean="0"/>
               <a:pPr/>
-              <a:t>20/08/2019</a:t>
+              <a:t>21/08/2019</a:t>
             </a:fld>
             <a:endParaRPr lang="es-ES"/>
           </a:p>
@@ -1650,7 +1651,7 @@
             <a:fld id="{01D25DD0-4F6C-4391-AB34-5533F4805C36}" type="slidenum">
               <a:rPr lang="es-ES" smtClean="0"/>
               <a:pPr/>
-              <a:t>‹Nº›</a:t>
+              <a:t>‹#›</a:t>
             </a:fld>
             <a:endParaRPr lang="es-ES"/>
           </a:p>
@@ -1876,7 +1877,7 @@
             <a:fld id="{25558161-4083-4137-B5EE-6591ED484BF1}" type="datetimeFigureOut">
               <a:rPr lang="es-ES" smtClean="0"/>
               <a:pPr/>
-              <a:t>20/08/2019</a:t>
+              <a:t>21/08/2019</a:t>
             </a:fld>
             <a:endParaRPr lang="es-ES"/>
           </a:p>
@@ -1919,7 +1920,7 @@
             <a:fld id="{01D25DD0-4F6C-4391-AB34-5533F4805C36}" type="slidenum">
               <a:rPr lang="es-ES" smtClean="0"/>
               <a:pPr/>
-              <a:t>‹Nº›</a:t>
+              <a:t>‹#›</a:t>
             </a:fld>
             <a:endParaRPr lang="es-ES"/>
           </a:p>
@@ -2259,7 +2260,7 @@
             <a:fld id="{25558161-4083-4137-B5EE-6591ED484BF1}" type="datetimeFigureOut">
               <a:rPr lang="es-ES" smtClean="0"/>
               <a:pPr/>
-              <a:t>20/08/2019</a:t>
+              <a:t>21/08/2019</a:t>
             </a:fld>
             <a:endParaRPr lang="es-ES"/>
           </a:p>
@@ -2302,7 +2303,7 @@
             <a:fld id="{01D25DD0-4F6C-4391-AB34-5533F4805C36}" type="slidenum">
               <a:rPr lang="es-ES" smtClean="0"/>
               <a:pPr/>
-              <a:t>‹Nº›</a:t>
+              <a:t>‹#›</a:t>
             </a:fld>
             <a:endParaRPr lang="es-ES"/>
           </a:p>
@@ -2414,7 +2415,7 @@
             <a:fld id="{25558161-4083-4137-B5EE-6591ED484BF1}" type="datetimeFigureOut">
               <a:rPr lang="es-ES" smtClean="0"/>
               <a:pPr/>
-              <a:t>20/08/2019</a:t>
+              <a:t>21/08/2019</a:t>
             </a:fld>
             <a:endParaRPr lang="es-ES"/>
           </a:p>
@@ -2457,7 +2458,7 @@
             <a:fld id="{01D25DD0-4F6C-4391-AB34-5533F4805C36}" type="slidenum">
               <a:rPr lang="es-ES" smtClean="0"/>
               <a:pPr/>
-              <a:t>‹Nº›</a:t>
+              <a:t>‹#›</a:t>
             </a:fld>
             <a:endParaRPr lang="es-ES"/>
           </a:p>
@@ -2509,7 +2510,7 @@
             <a:fld id="{25558161-4083-4137-B5EE-6591ED484BF1}" type="datetimeFigureOut">
               <a:rPr lang="es-ES" smtClean="0"/>
               <a:pPr/>
-              <a:t>20/08/2019</a:t>
+              <a:t>21/08/2019</a:t>
             </a:fld>
             <a:endParaRPr lang="es-ES"/>
           </a:p>
@@ -2552,7 +2553,7 @@
             <a:fld id="{01D25DD0-4F6C-4391-AB34-5533F4805C36}" type="slidenum">
               <a:rPr lang="es-ES" smtClean="0"/>
               <a:pPr/>
-              <a:t>‹Nº›</a:t>
+              <a:t>‹#›</a:t>
             </a:fld>
             <a:endParaRPr lang="es-ES"/>
           </a:p>
@@ -2775,7 +2776,7 @@
             <a:fld id="{25558161-4083-4137-B5EE-6591ED484BF1}" type="datetimeFigureOut">
               <a:rPr lang="es-ES" smtClean="0"/>
               <a:pPr/>
-              <a:t>20/08/2019</a:t>
+              <a:t>21/08/2019</a:t>
             </a:fld>
             <a:endParaRPr lang="es-ES"/>
           </a:p>
@@ -2818,7 +2819,7 @@
             <a:fld id="{01D25DD0-4F6C-4391-AB34-5533F4805C36}" type="slidenum">
               <a:rPr lang="es-ES" smtClean="0"/>
               <a:pPr/>
-              <a:t>‹Nº›</a:t>
+              <a:t>‹#›</a:t>
             </a:fld>
             <a:endParaRPr lang="es-ES"/>
           </a:p>
@@ -3068,7 +3069,7 @@
             <a:fld id="{25558161-4083-4137-B5EE-6591ED484BF1}" type="datetimeFigureOut">
               <a:rPr lang="es-ES" smtClean="0"/>
               <a:pPr/>
-              <a:t>20/08/2019</a:t>
+              <a:t>21/08/2019</a:t>
             </a:fld>
             <a:endParaRPr lang="es-ES"/>
           </a:p>
@@ -3116,7 +3117,7 @@
             <a:fld id="{01D25DD0-4F6C-4391-AB34-5533F4805C36}" type="slidenum">
               <a:rPr lang="es-ES" smtClean="0"/>
               <a:pPr/>
-              <a:t>‹Nº›</a:t>
+              <a:t>‹#›</a:t>
             </a:fld>
             <a:endParaRPr lang="es-ES"/>
           </a:p>
@@ -3844,7 +3845,7 @@
             <a:fld id="{25558161-4083-4137-B5EE-6591ED484BF1}" type="datetimeFigureOut">
               <a:rPr lang="es-ES" smtClean="0"/>
               <a:pPr/>
-              <a:t>20/08/2019</a:t>
+              <a:t>21/08/2019</a:t>
             </a:fld>
             <a:endParaRPr lang="es-ES"/>
           </a:p>
@@ -3923,7 +3924,7 @@
             <a:fld id="{01D25DD0-4F6C-4391-AB34-5533F4805C36}" type="slidenum">
               <a:rPr lang="es-ES" smtClean="0"/>
               <a:pPr/>
-              <a:t>‹Nº›</a:t>
+              <a:t>‹#›</a:t>
             </a:fld>
             <a:endParaRPr lang="es-ES"/>
           </a:p>
@@ -5927,10 +5928,10 @@
       </p:sp>
       <p:pic>
         <p:nvPicPr>
-          <p:cNvPr id="3" name="Imagen 2">
+          <p:cNvPr id="23" name="Picture 22" descr="A screenshot of a cell phone&#10;&#10;Description automatically generated">
             <a:extLst>
               <a:ext uri="{FF2B5EF4-FFF2-40B4-BE49-F238E27FC236}">
-                <a16:creationId xmlns:a16="http://schemas.microsoft.com/office/drawing/2014/main" id="{6CE57038-0C2E-4C80-A77D-F762C79123AA}"/>
+                <a16:creationId xmlns:a16="http://schemas.microsoft.com/office/drawing/2014/main" id="{86C19C48-A394-46B2-B2CC-893D21E0F51A}"/>
               </a:ext>
             </a:extLst>
           </p:cNvPr>
@@ -5940,15 +5941,21 @@
           <p:nvPr/>
         </p:nvPicPr>
         <p:blipFill>
-          <a:blip r:embed="rId2"/>
+          <a:blip r:embed="rId2" cstate="print">
+            <a:extLst>
+              <a:ext uri="{28A0092B-C50C-407E-A947-70E740481C1C}">
+                <a14:useLocalDpi xmlns:a14="http://schemas.microsoft.com/office/drawing/2010/main" val="0"/>
+              </a:ext>
+            </a:extLst>
+          </a:blip>
           <a:stretch>
             <a:fillRect/>
           </a:stretch>
         </p:blipFill>
         <p:spPr>
           <a:xfrm>
-            <a:off x="5508104" y="2523955"/>
-            <a:ext cx="2225442" cy="3471689"/>
+            <a:off x="755576" y="2339752"/>
+            <a:ext cx="2465006" cy="4382232"/>
           </a:xfrm>
           <a:prstGeom prst="rect">
             <a:avLst/>
@@ -5957,10 +5964,10 @@
       </p:pic>
       <p:pic>
         <p:nvPicPr>
-          <p:cNvPr id="5" name="Imagen 4">
+          <p:cNvPr id="24" name="Picture 23" descr="A close up of a dog&#10;&#10;Description automatically generated">
             <a:extLst>
               <a:ext uri="{FF2B5EF4-FFF2-40B4-BE49-F238E27FC236}">
-                <a16:creationId xmlns:a16="http://schemas.microsoft.com/office/drawing/2014/main" id="{F8AA05EB-E9F2-4DA1-982E-3D192157FF7D}"/>
+                <a16:creationId xmlns:a16="http://schemas.microsoft.com/office/drawing/2014/main" id="{057FEB18-3EE4-404C-8233-9FF15F74787E}"/>
               </a:ext>
             </a:extLst>
           </p:cNvPr>
@@ -5970,15 +5977,21 @@
           <p:nvPr/>
         </p:nvPicPr>
         <p:blipFill>
-          <a:blip r:embed="rId3"/>
+          <a:blip r:embed="rId3" cstate="print">
+            <a:extLst>
+              <a:ext uri="{28A0092B-C50C-407E-A947-70E740481C1C}">
+                <a14:useLocalDpi xmlns:a14="http://schemas.microsoft.com/office/drawing/2010/main" val="0"/>
+              </a:ext>
+            </a:extLst>
+          </a:blip>
           <a:stretch>
             <a:fillRect/>
           </a:stretch>
         </p:blipFill>
         <p:spPr>
           <a:xfrm>
-            <a:off x="1547664" y="2307175"/>
-            <a:ext cx="2657475" cy="3905250"/>
+            <a:off x="4600660" y="2348880"/>
+            <a:ext cx="2536380" cy="4509120"/>
           </a:xfrm>
           <a:prstGeom prst="rect">
             <a:avLst/>
@@ -6015,42 +6028,10 @@
       </p:grpSpPr>
       <p:pic>
         <p:nvPicPr>
-          <p:cNvPr id="6" name="Marcador de contenido 5">
+          <p:cNvPr id="7" name="Picture 6" descr="A screenshot of a cell phone&#10;&#10;Description automatically generated">
             <a:extLst>
               <a:ext uri="{FF2B5EF4-FFF2-40B4-BE49-F238E27FC236}">
-                <a16:creationId xmlns:a16="http://schemas.microsoft.com/office/drawing/2014/main" id="{F561744F-9833-44BA-AA0F-D982B3C73447}"/>
-              </a:ext>
-            </a:extLst>
-          </p:cNvPr>
-          <p:cNvPicPr>
-            <a:picLocks noGrp="1" noChangeAspect="1"/>
-          </p:cNvPicPr>
-          <p:nvPr>
-            <p:ph idx="1"/>
-          </p:nvPr>
-        </p:nvPicPr>
-        <p:blipFill>
-          <a:blip r:embed="rId2"/>
-          <a:stretch>
-            <a:fillRect/>
-          </a:stretch>
-        </p:blipFill>
-        <p:spPr>
-          <a:xfrm>
-            <a:off x="5248227" y="1477604"/>
-            <a:ext cx="2767057" cy="4389437"/>
-          </a:xfrm>
-          <a:prstGeom prst="rect">
-            <a:avLst/>
-          </a:prstGeom>
-        </p:spPr>
-      </p:pic>
-      <p:pic>
-        <p:nvPicPr>
-          <p:cNvPr id="8" name="Imagen 7">
-            <a:extLst>
-              <a:ext uri="{FF2B5EF4-FFF2-40B4-BE49-F238E27FC236}">
-                <a16:creationId xmlns:a16="http://schemas.microsoft.com/office/drawing/2014/main" id="{3DD4131F-E958-4EDF-8CF9-76079036F1EA}"/>
+                <a16:creationId xmlns:a16="http://schemas.microsoft.com/office/drawing/2014/main" id="{4F445C55-3AAA-42B9-8D77-A41E4E782069}"/>
               </a:ext>
             </a:extLst>
           </p:cNvPr>
@@ -6060,21 +6041,116 @@
           <p:nvPr/>
         </p:nvPicPr>
         <p:blipFill>
-          <a:blip r:embed="rId3"/>
+          <a:blip r:embed="rId2" cstate="print">
+            <a:extLst>
+              <a:ext uri="{28A0092B-C50C-407E-A947-70E740481C1C}">
+                <a14:useLocalDpi xmlns:a14="http://schemas.microsoft.com/office/drawing/2010/main" val="0"/>
+              </a:ext>
+            </a:extLst>
+          </a:blip>
           <a:stretch>
             <a:fillRect/>
           </a:stretch>
         </p:blipFill>
         <p:spPr>
           <a:xfrm>
-            <a:off x="971600" y="1470342"/>
-            <a:ext cx="2924175" cy="4762500"/>
+            <a:off x="5436096" y="1871486"/>
+            <a:ext cx="2606892" cy="4634474"/>
           </a:xfrm>
           <a:prstGeom prst="rect">
             <a:avLst/>
           </a:prstGeom>
         </p:spPr>
       </p:pic>
+      <p:pic>
+        <p:nvPicPr>
+          <p:cNvPr id="9" name="Picture 8" descr="A screenshot of a cell phone&#10;&#10;Description automatically generated">
+            <a:extLst>
+              <a:ext uri="{FF2B5EF4-FFF2-40B4-BE49-F238E27FC236}">
+                <a16:creationId xmlns:a16="http://schemas.microsoft.com/office/drawing/2014/main" id="{28B89A61-375B-47F9-AE35-ED54A1ACDD5B}"/>
+              </a:ext>
+            </a:extLst>
+          </p:cNvPr>
+          <p:cNvPicPr>
+            <a:picLocks noChangeAspect="1"/>
+          </p:cNvPicPr>
+          <p:nvPr/>
+        </p:nvPicPr>
+        <p:blipFill>
+          <a:blip r:embed="rId3" cstate="print">
+            <a:extLst>
+              <a:ext uri="{28A0092B-C50C-407E-A947-70E740481C1C}">
+                <a14:useLocalDpi xmlns:a14="http://schemas.microsoft.com/office/drawing/2010/main" val="0"/>
+              </a:ext>
+            </a:extLst>
+          </a:blip>
+          <a:stretch>
+            <a:fillRect/>
+          </a:stretch>
+        </p:blipFill>
+        <p:spPr>
+          <a:xfrm>
+            <a:off x="1331640" y="1871486"/>
+            <a:ext cx="2504876" cy="4453113"/>
+          </a:xfrm>
+          <a:prstGeom prst="rect">
+            <a:avLst/>
+          </a:prstGeom>
+        </p:spPr>
+      </p:pic>
+      <p:sp>
+        <p:nvSpPr>
+          <p:cNvPr id="4" name="TextBox 3">
+            <a:extLst>
+              <a:ext uri="{FF2B5EF4-FFF2-40B4-BE49-F238E27FC236}">
+                <a16:creationId xmlns:a16="http://schemas.microsoft.com/office/drawing/2014/main" id="{9CE549E3-2920-4335-AE9D-5A99B066B2FD}"/>
+              </a:ext>
+            </a:extLst>
+          </p:cNvPr>
+          <p:cNvSpPr txBox="1"/>
+          <p:nvPr/>
+        </p:nvSpPr>
+        <p:spPr>
+          <a:xfrm>
+            <a:off x="971600" y="332656"/>
+            <a:ext cx="6984776" cy="1323439"/>
+          </a:xfrm>
+          <a:prstGeom prst="rect">
+            <a:avLst/>
+          </a:prstGeom>
+          <a:noFill/>
+        </p:spPr>
+        <p:txBody>
+          <a:bodyPr wrap="square" rtlCol="0">
+            <a:spAutoFit/>
+          </a:bodyPr>
+          <a:lstStyle/>
+          <a:p>
+            <a:pPr algn="ctr">
+              <a:spcBef>
+                <a:spcPct val="0"/>
+              </a:spcBef>
+            </a:pPr>
+            <a:r>
+              <a:rPr lang="en-US" sz="4000" dirty="0">
+                <a:solidFill>
+                  <a:schemeClr val="tx2"/>
+                </a:solidFill>
+                <a:latin typeface="Century Gothic"/>
+                <a:ea typeface="+mj-ea"/>
+              </a:rPr>
+              <a:t>PAGINA DE USUARIO - HOGAR</a:t>
+            </a:r>
+            <a:endParaRPr lang="es-US" sz="4000" dirty="0">
+              <a:solidFill>
+                <a:schemeClr val="tx2"/>
+              </a:solidFill>
+              <a:latin typeface="Century Gothic"/>
+              <a:ea typeface="+mj-ea"/>
+            </a:endParaRPr>
+          </a:p>
+        </p:txBody>
+      </p:sp>
     </p:spTree>
     <p:extLst>
       <p:ext uri="{BB962C8B-B14F-4D97-AF65-F5344CB8AC3E}">
@@ -6110,10 +6186,10 @@
       </p:grpSpPr>
       <p:pic>
         <p:nvPicPr>
-          <p:cNvPr id="8" name="Imagen 7">
+          <p:cNvPr id="5" name="Picture 4" descr="A screenshot of a cell phone&#10;&#10;Description automatically generated">
             <a:extLst>
               <a:ext uri="{FF2B5EF4-FFF2-40B4-BE49-F238E27FC236}">
-                <a16:creationId xmlns:a16="http://schemas.microsoft.com/office/drawing/2014/main" id="{F4F715F6-D59C-4035-A3CD-9F8D20C06148}"/>
+                <a16:creationId xmlns:a16="http://schemas.microsoft.com/office/drawing/2014/main" id="{C1F7A489-497F-4E9C-B619-5DA73EBB17DA}"/>
               </a:ext>
             </a:extLst>
           </p:cNvPr>
@@ -6123,15 +6199,21 @@
           <p:nvPr/>
         </p:nvPicPr>
         <p:blipFill>
-          <a:blip r:embed="rId2"/>
+          <a:blip r:embed="rId2" cstate="print">
+            <a:extLst>
+              <a:ext uri="{28A0092B-C50C-407E-A947-70E740481C1C}">
+                <a14:useLocalDpi xmlns:a14="http://schemas.microsoft.com/office/drawing/2010/main" val="0"/>
+              </a:ext>
+            </a:extLst>
+          </a:blip>
           <a:stretch>
             <a:fillRect/>
           </a:stretch>
         </p:blipFill>
         <p:spPr>
           <a:xfrm>
-            <a:off x="899592" y="1253415"/>
-            <a:ext cx="3009900" cy="4686300"/>
+            <a:off x="6274223" y="1484784"/>
+            <a:ext cx="2536380" cy="4509120"/>
           </a:xfrm>
           <a:prstGeom prst="rect">
             <a:avLst/>
@@ -6140,10 +6222,10 @@
       </p:pic>
       <p:pic>
         <p:nvPicPr>
-          <p:cNvPr id="9" name="Imagen 8">
+          <p:cNvPr id="15" name="Picture 14" descr="A screenshot of a cell phone&#10;&#10;Description automatically generated">
             <a:extLst>
               <a:ext uri="{FF2B5EF4-FFF2-40B4-BE49-F238E27FC236}">
-                <a16:creationId xmlns:a16="http://schemas.microsoft.com/office/drawing/2014/main" id="{FAF6AB78-DDF7-4C54-B081-F4804D166CAC}"/>
+                <a16:creationId xmlns:a16="http://schemas.microsoft.com/office/drawing/2014/main" id="{BEA4CC42-8F9D-4E9B-BAD5-FCCC835DF94C}"/>
               </a:ext>
             </a:extLst>
           </p:cNvPr>
@@ -6153,21 +6235,97 @@
           <p:nvPr/>
         </p:nvPicPr>
         <p:blipFill>
-          <a:blip r:embed="rId3"/>
+          <a:blip r:embed="rId3" cstate="print">
+            <a:extLst>
+              <a:ext uri="{28A0092B-C50C-407E-A947-70E740481C1C}">
+                <a14:useLocalDpi xmlns:a14="http://schemas.microsoft.com/office/drawing/2010/main" val="0"/>
+              </a:ext>
+            </a:extLst>
+          </a:blip>
           <a:stretch>
             <a:fillRect/>
           </a:stretch>
         </p:blipFill>
         <p:spPr>
           <a:xfrm>
-            <a:off x="5076056" y="1244405"/>
-            <a:ext cx="2962275" cy="4581525"/>
+            <a:off x="539552" y="1484784"/>
+            <a:ext cx="2536380" cy="4509120"/>
           </a:xfrm>
           <a:prstGeom prst="rect">
             <a:avLst/>
           </a:prstGeom>
         </p:spPr>
       </p:pic>
+      <p:pic>
+        <p:nvPicPr>
+          <p:cNvPr id="22" name="Picture 21" descr="A screenshot of a cell phone&#10;&#10;Description automatically generated">
+            <a:extLst>
+              <a:ext uri="{FF2B5EF4-FFF2-40B4-BE49-F238E27FC236}">
+                <a16:creationId xmlns:a16="http://schemas.microsoft.com/office/drawing/2014/main" id="{BF888BFF-6F9B-4874-8055-8D58475DC4A5}"/>
+              </a:ext>
+            </a:extLst>
+          </p:cNvPr>
+          <p:cNvPicPr>
+            <a:picLocks noChangeAspect="1"/>
+          </p:cNvPicPr>
+          <p:nvPr/>
+        </p:nvPicPr>
+        <p:blipFill>
+          <a:blip r:embed="rId4" cstate="print">
+            <a:extLst>
+              <a:ext uri="{28A0092B-C50C-407E-A947-70E740481C1C}">
+                <a14:useLocalDpi xmlns:a14="http://schemas.microsoft.com/office/drawing/2010/main" val="0"/>
+              </a:ext>
+            </a:extLst>
+          </a:blip>
+          <a:stretch>
+            <a:fillRect/>
+          </a:stretch>
+        </p:blipFill>
+        <p:spPr>
+          <a:xfrm>
+            <a:off x="3500881" y="1484784"/>
+            <a:ext cx="2536380" cy="4509120"/>
+          </a:xfrm>
+          <a:prstGeom prst="rect">
+            <a:avLst/>
+          </a:prstGeom>
+        </p:spPr>
+      </p:pic>
+      <p:sp>
+        <p:nvSpPr>
+          <p:cNvPr id="23" name="Title 1">
+            <a:extLst>
+              <a:ext uri="{FF2B5EF4-FFF2-40B4-BE49-F238E27FC236}">
+                <a16:creationId xmlns:a16="http://schemas.microsoft.com/office/drawing/2014/main" id="{FBA82377-FDCB-4AAD-B0B0-52B8B05FC706}"/>
+              </a:ext>
+            </a:extLst>
+          </p:cNvPr>
+          <p:cNvSpPr>
+            <a:spLocks noGrp="1"/>
+          </p:cNvSpPr>
+          <p:nvPr>
+            <p:ph type="title"/>
+          </p:nvPr>
+        </p:nvSpPr>
+        <p:spPr>
+          <a:xfrm>
+            <a:off x="581003" y="292596"/>
+            <a:ext cx="8229600" cy="1143000"/>
+          </a:xfrm>
+        </p:spPr>
+        <p:txBody>
+          <a:bodyPr/>
+          <a:lstStyle/>
+          <a:p>
+            <a:r>
+              <a:rPr lang="en-US" dirty="0"/>
+              <a:t>SALA – GARAJE - CUARTO</a:t>
+            </a:r>
+            <a:endParaRPr lang="es-US" dirty="0"/>
+          </a:p>
+        </p:txBody>
+      </p:sp>
     </p:spTree>
     <p:extLst>
       <p:ext uri="{BB962C8B-B14F-4D97-AF65-F5344CB8AC3E}">
@@ -6203,10 +6361,10 @@
       </p:grpSpPr>
       <p:sp>
         <p:nvSpPr>
-          <p:cNvPr id="2" name="Título 1">
+          <p:cNvPr id="2" name="Title 1">
             <a:extLst>
               <a:ext uri="{FF2B5EF4-FFF2-40B4-BE49-F238E27FC236}">
-                <a16:creationId xmlns:a16="http://schemas.microsoft.com/office/drawing/2014/main" id="{45A9FC79-A037-4B19-84BB-C15CAB46BB30}"/>
+                <a16:creationId xmlns:a16="http://schemas.microsoft.com/office/drawing/2014/main" id="{ED7A7D45-5AC4-4243-814F-B4F3E6070A2D}"/>
               </a:ext>
             </a:extLst>
           </p:cNvPr>
@@ -6223,102 +6381,89 @@
           <a:lstStyle/>
           <a:p>
             <a:r>
-              <a:rPr lang="es-MX" dirty="0"/>
-              <a:t>CONCLUSION</a:t>
-            </a:r>
-            <a:endParaRPr lang="es-EC" dirty="0"/>
-          </a:p>
-        </p:txBody>
-      </p:sp>
-      <p:sp>
-        <p:nvSpPr>
-          <p:cNvPr id="3" name="Marcador de contenido 2">
+              <a:rPr lang="en-US" dirty="0"/>
+              <a:t>JARDIN -COMEDOR</a:t>
+            </a:r>
+            <a:endParaRPr lang="es-US" dirty="0"/>
+          </a:p>
+        </p:txBody>
+      </p:sp>
+      <p:pic>
+        <p:nvPicPr>
+          <p:cNvPr id="4" name="Picture 3" descr="A screenshot of a cell phone&#10;&#10;Description automatically generated">
             <a:extLst>
               <a:ext uri="{FF2B5EF4-FFF2-40B4-BE49-F238E27FC236}">
-                <a16:creationId xmlns:a16="http://schemas.microsoft.com/office/drawing/2014/main" id="{91973683-B8A2-4513-862F-993978A254D0}"/>
+                <a16:creationId xmlns:a16="http://schemas.microsoft.com/office/drawing/2014/main" id="{A6FF7A40-C903-437C-9E2B-4F9CCCE5F6A8}"/>
               </a:ext>
             </a:extLst>
           </p:cNvPr>
-          <p:cNvSpPr>
-            <a:spLocks noGrp="1"/>
-          </p:cNvSpPr>
-          <p:nvPr>
-            <p:ph idx="1"/>
-          </p:nvPr>
-        </p:nvSpPr>
-        <p:spPr/>
-        <p:txBody>
-          <a:bodyPr/>
-          <a:lstStyle/>
-          <a:p>
-            <a:r>
-              <a:rPr lang="es-MX" dirty="0" err="1"/>
-              <a:t>Firebase</a:t>
-            </a:r>
-            <a:r>
-              <a:rPr lang="es-MX" dirty="0"/>
-              <a:t> es una base de datos muy útil y fácil de acceder.</a:t>
-            </a:r>
-          </a:p>
-          <a:p>
-            <a:r>
-              <a:rPr lang="es-MX" dirty="0"/>
-              <a:t>El modulo ESP32 es mas dinámico para aplicaciones mas fuertes de </a:t>
-            </a:r>
-            <a:r>
-              <a:rPr lang="es-MX" dirty="0" err="1"/>
-              <a:t>big</a:t>
-            </a:r>
-            <a:r>
-              <a:rPr lang="es-MX" dirty="0"/>
-              <a:t> data que el Arduino.</a:t>
-            </a:r>
-          </a:p>
-          <a:p>
-            <a:r>
-              <a:rPr lang="es-MX" dirty="0"/>
-              <a:t>La implementación de forma industrial depende únicamente de cambiar el </a:t>
-            </a:r>
-            <a:r>
-              <a:rPr lang="es-MX" dirty="0" err="1"/>
-              <a:t>el</a:t>
-            </a:r>
-            <a:r>
-              <a:rPr lang="es-MX" dirty="0"/>
-              <a:t> </a:t>
-            </a:r>
-            <a:r>
-              <a:rPr lang="es-MX" dirty="0" err="1"/>
-              <a:t>switch</a:t>
-            </a:r>
-            <a:r>
-              <a:rPr lang="es-MX" dirty="0"/>
-              <a:t> </a:t>
-            </a:r>
-            <a:r>
-              <a:rPr lang="es-MX" dirty="0" err="1"/>
-              <a:t>rele</a:t>
-            </a:r>
-            <a:r>
-              <a:rPr lang="es-MX" dirty="0"/>
-              <a:t> para alimentar mis componentes </a:t>
-            </a:r>
-            <a:r>
-              <a:rPr lang="es-MX" dirty="0" err="1"/>
-              <a:t>mecatronicos</a:t>
-            </a:r>
-            <a:r>
-              <a:rPr lang="es-MX" dirty="0"/>
-              <a:t> o mecánicos.</a:t>
-            </a:r>
-            <a:endParaRPr lang="es-EC" dirty="0"/>
-          </a:p>
-        </p:txBody>
-      </p:sp>
+          <p:cNvPicPr>
+            <a:picLocks noChangeAspect="1"/>
+          </p:cNvPicPr>
+          <p:nvPr/>
+        </p:nvPicPr>
+        <p:blipFill>
+          <a:blip r:embed="rId2" cstate="print">
+            <a:extLst>
+              <a:ext uri="{28A0092B-C50C-407E-A947-70E740481C1C}">
+                <a14:useLocalDpi xmlns:a14="http://schemas.microsoft.com/office/drawing/2010/main" val="0"/>
+              </a:ext>
+            </a:extLst>
+          </a:blip>
+          <a:stretch>
+            <a:fillRect/>
+          </a:stretch>
+        </p:blipFill>
+        <p:spPr>
+          <a:xfrm>
+            <a:off x="3923928" y="2313484"/>
+            <a:ext cx="2160241" cy="3840428"/>
+          </a:xfrm>
+          <a:prstGeom prst="rect">
+            <a:avLst/>
+          </a:prstGeom>
+        </p:spPr>
+      </p:pic>
+      <p:pic>
+        <p:nvPicPr>
+          <p:cNvPr id="5" name="Picture 4" descr="A screenshot of a cell phone&#10;&#10;Description automatically generated">
+            <a:extLst>
+              <a:ext uri="{FF2B5EF4-FFF2-40B4-BE49-F238E27FC236}">
+                <a16:creationId xmlns:a16="http://schemas.microsoft.com/office/drawing/2014/main" id="{06EB1658-A2E1-4F40-9E0B-4C21893B7EBE}"/>
+              </a:ext>
+            </a:extLst>
+          </p:cNvPr>
+          <p:cNvPicPr>
+            <a:picLocks noChangeAspect="1"/>
+          </p:cNvPicPr>
+          <p:nvPr/>
+        </p:nvPicPr>
+        <p:blipFill>
+          <a:blip r:embed="rId3" cstate="print">
+            <a:extLst>
+              <a:ext uri="{28A0092B-C50C-407E-A947-70E740481C1C}">
+                <a14:useLocalDpi xmlns:a14="http://schemas.microsoft.com/office/drawing/2010/main" val="0"/>
+              </a:ext>
+            </a:extLst>
+          </a:blip>
+          <a:stretch>
+            <a:fillRect/>
+          </a:stretch>
+        </p:blipFill>
+        <p:spPr>
+          <a:xfrm>
+            <a:off x="611561" y="2313484"/>
+            <a:ext cx="2160240" cy="3840427"/>
+          </a:xfrm>
+          <a:prstGeom prst="rect">
+            <a:avLst/>
+          </a:prstGeom>
+        </p:spPr>
+      </p:pic>
     </p:spTree>
     <p:extLst>
       <p:ext uri="{BB962C8B-B14F-4D97-AF65-F5344CB8AC3E}">
-        <p14:creationId xmlns:p14="http://schemas.microsoft.com/office/powerpoint/2010/main" val="4170417918"/>
+        <p14:creationId xmlns:p14="http://schemas.microsoft.com/office/powerpoint/2010/main" val="3520057282"/>
       </p:ext>
     </p:extLst>
   </p:cSld>
@@ -7074,6 +7219,153 @@
 </file>
 
 <file path=ppt/slides/slide20.xml><?xml version="1.0" encoding="utf-8"?>
+<p:sld xmlns:a="http://schemas.openxmlformats.org/drawingml/2006/main" xmlns:r="http://schemas.openxmlformats.org/officeDocument/2006/relationships" xmlns:p="http://schemas.openxmlformats.org/presentationml/2006/main">
+  <p:cSld>
+    <p:spTree>
+      <p:nvGrpSpPr>
+        <p:cNvPr id="1" name=""/>
+        <p:cNvGrpSpPr/>
+        <p:nvPr/>
+      </p:nvGrpSpPr>
+      <p:grpSpPr>
+        <a:xfrm>
+          <a:off x="0" y="0"/>
+          <a:ext cx="0" cy="0"/>
+          <a:chOff x="0" y="0"/>
+          <a:chExt cx="0" cy="0"/>
+        </a:xfrm>
+      </p:grpSpPr>
+      <p:sp>
+        <p:nvSpPr>
+          <p:cNvPr id="2" name="Título 1">
+            <a:extLst>
+              <a:ext uri="{FF2B5EF4-FFF2-40B4-BE49-F238E27FC236}">
+                <a16:creationId xmlns:a16="http://schemas.microsoft.com/office/drawing/2014/main" id="{45A9FC79-A037-4B19-84BB-C15CAB46BB30}"/>
+              </a:ext>
+            </a:extLst>
+          </p:cNvPr>
+          <p:cNvSpPr>
+            <a:spLocks noGrp="1"/>
+          </p:cNvSpPr>
+          <p:nvPr>
+            <p:ph type="title"/>
+          </p:nvPr>
+        </p:nvSpPr>
+        <p:spPr/>
+        <p:txBody>
+          <a:bodyPr/>
+          <a:lstStyle/>
+          <a:p>
+            <a:r>
+              <a:rPr lang="es-MX" dirty="0"/>
+              <a:t>CONCLUSION</a:t>
+            </a:r>
+            <a:endParaRPr lang="es-EC" dirty="0"/>
+          </a:p>
+        </p:txBody>
+      </p:sp>
+      <p:sp>
+        <p:nvSpPr>
+          <p:cNvPr id="3" name="Marcador de contenido 2">
+            <a:extLst>
+              <a:ext uri="{FF2B5EF4-FFF2-40B4-BE49-F238E27FC236}">
+                <a16:creationId xmlns:a16="http://schemas.microsoft.com/office/drawing/2014/main" id="{91973683-B8A2-4513-862F-993978A254D0}"/>
+              </a:ext>
+            </a:extLst>
+          </p:cNvPr>
+          <p:cNvSpPr>
+            <a:spLocks noGrp="1"/>
+          </p:cNvSpPr>
+          <p:nvPr>
+            <p:ph idx="1"/>
+          </p:nvPr>
+        </p:nvSpPr>
+        <p:spPr/>
+        <p:txBody>
+          <a:bodyPr/>
+          <a:lstStyle/>
+          <a:p>
+            <a:r>
+              <a:rPr lang="es-MX" dirty="0" err="1"/>
+              <a:t>Firebase</a:t>
+            </a:r>
+            <a:r>
+              <a:rPr lang="es-MX" dirty="0"/>
+              <a:t> es una base de datos muy útil y fácil de acceder.</a:t>
+            </a:r>
+          </a:p>
+          <a:p>
+            <a:r>
+              <a:rPr lang="es-MX" dirty="0"/>
+              <a:t>El modulo ESP32 es mas dinámico para aplicaciones mas fuertes de </a:t>
+            </a:r>
+            <a:r>
+              <a:rPr lang="es-MX" dirty="0" err="1"/>
+              <a:t>big</a:t>
+            </a:r>
+            <a:r>
+              <a:rPr lang="es-MX" dirty="0"/>
+              <a:t> data que el Arduino.</a:t>
+            </a:r>
+          </a:p>
+          <a:p>
+            <a:r>
+              <a:rPr lang="es-MX" dirty="0"/>
+              <a:t>La implementación de forma industrial depende únicamente de cambiar el </a:t>
+            </a:r>
+            <a:r>
+              <a:rPr lang="es-MX" dirty="0" err="1"/>
+              <a:t>el</a:t>
+            </a:r>
+            <a:r>
+              <a:rPr lang="es-MX" dirty="0"/>
+              <a:t> </a:t>
+            </a:r>
+            <a:r>
+              <a:rPr lang="es-MX" dirty="0" err="1"/>
+              <a:t>switch</a:t>
+            </a:r>
+            <a:r>
+              <a:rPr lang="es-MX" dirty="0"/>
+              <a:t> </a:t>
+            </a:r>
+            <a:r>
+              <a:rPr lang="es-MX" dirty="0" err="1"/>
+              <a:t>rele</a:t>
+            </a:r>
+            <a:r>
+              <a:rPr lang="es-MX" dirty="0"/>
+              <a:t> para alimentar mis componentes </a:t>
+            </a:r>
+            <a:r>
+              <a:rPr lang="es-MX" dirty="0" err="1"/>
+              <a:t>mecatronicos</a:t>
+            </a:r>
+            <a:r>
+              <a:rPr lang="es-MX" dirty="0"/>
+              <a:t> o mecánicos.</a:t>
+            </a:r>
+            <a:endParaRPr lang="es-EC" dirty="0"/>
+          </a:p>
+        </p:txBody>
+      </p:sp>
+    </p:spTree>
+    <p:extLst>
+      <p:ext uri="{BB962C8B-B14F-4D97-AF65-F5344CB8AC3E}">
+        <p14:creationId xmlns:p14="http://schemas.microsoft.com/office/powerpoint/2010/main" val="4170417918"/>
+      </p:ext>
+    </p:extLst>
+  </p:cSld>
+  <p:clrMapOvr>
+    <a:masterClrMapping/>
+  </p:clrMapOvr>
+  <p:transition spd="slow">
+    <p:fade/>
+  </p:transition>
+</p:sld>
+</file>
+
+<file path=ppt/slides/slide21.xml><?xml version="1.0" encoding="utf-8"?>
 <p:sld xmlns:a="http://schemas.openxmlformats.org/drawingml/2006/main" xmlns:r="http://schemas.openxmlformats.org/officeDocument/2006/relationships" xmlns:p="http://schemas.openxmlformats.org/presentationml/2006/main">
   <p:cSld>
     <p:spTree>

</xml_diff>